<commit_message>
policy creation e.g. 2
</commit_message>
<xml_diff>
--- a/examples/graphs.pptx
+++ b/examples/graphs.pptx
@@ -6551,7 +6551,7 @@
         </p:nvSpPr>
         <p:spPr>
           <a:xfrm>
-            <a:off x="586580" y="3200900"/>
+            <a:off x="586580" y="3213616"/>
             <a:ext cx="1499558" cy="573024"/>
           </a:xfrm>
           <a:prstGeom prst="ellipse">
@@ -8084,88 +8084,6 @@
           </a:fontRef>
         </p:style>
       </p:cxnSp>
-      <p:cxnSp>
-        <p:nvCxnSpPr>
-          <p:cNvPr id="151" name="Straight Arrow Connector 150"/>
-          <p:cNvCxnSpPr>
-            <a:stCxn id="20" idx="2"/>
-            <a:endCxn id="31" idx="3"/>
-          </p:cNvCxnSpPr>
-          <p:nvPr/>
-        </p:nvCxnSpPr>
-        <p:spPr>
-          <a:xfrm>
-            <a:off x="1336359" y="4830972"/>
-            <a:ext cx="2015491" cy="508763"/>
-          </a:xfrm>
-          <a:prstGeom prst="straightConnector1">
-            <a:avLst/>
-          </a:prstGeom>
-          <a:ln>
-            <a:solidFill>
-              <a:schemeClr val="tx1"/>
-            </a:solidFill>
-            <a:prstDash val="solid"/>
-            <a:headEnd type="none" w="med" len="med"/>
-            <a:tailEnd type="arrow" w="med" len="med"/>
-          </a:ln>
-        </p:spPr>
-        <p:style>
-          <a:lnRef idx="1">
-            <a:schemeClr val="accent1"/>
-          </a:lnRef>
-          <a:fillRef idx="0">
-            <a:schemeClr val="accent1"/>
-          </a:fillRef>
-          <a:effectRef idx="0">
-            <a:schemeClr val="accent1"/>
-          </a:effectRef>
-          <a:fontRef idx="minor">
-            <a:schemeClr val="tx1"/>
-          </a:fontRef>
-        </p:style>
-      </p:cxnSp>
-      <p:cxnSp>
-        <p:nvCxnSpPr>
-          <p:cNvPr id="154" name="Straight Arrow Connector 153"/>
-          <p:cNvCxnSpPr>
-            <a:stCxn id="28" idx="2"/>
-            <a:endCxn id="31" idx="3"/>
-          </p:cNvCxnSpPr>
-          <p:nvPr/>
-        </p:nvCxnSpPr>
-        <p:spPr>
-          <a:xfrm flipH="1">
-            <a:off x="3351850" y="4843182"/>
-            <a:ext cx="1991676" cy="496553"/>
-          </a:xfrm>
-          <a:prstGeom prst="straightConnector1">
-            <a:avLst/>
-          </a:prstGeom>
-          <a:ln>
-            <a:solidFill>
-              <a:schemeClr val="tx1"/>
-            </a:solidFill>
-            <a:prstDash val="solid"/>
-            <a:headEnd type="none" w="med" len="med"/>
-            <a:tailEnd type="arrow" w="med" len="med"/>
-          </a:ln>
-        </p:spPr>
-        <p:style>
-          <a:lnRef idx="1">
-            <a:schemeClr val="accent1"/>
-          </a:lnRef>
-          <a:fillRef idx="0">
-            <a:schemeClr val="accent1"/>
-          </a:fillRef>
-          <a:effectRef idx="0">
-            <a:schemeClr val="accent1"/>
-          </a:effectRef>
-          <a:fontRef idx="minor">
-            <a:schemeClr val="tx1"/>
-          </a:fontRef>
-        </p:style>
-      </p:cxnSp>
       <p:sp>
         <p:nvSpPr>
           <p:cNvPr id="52" name="TextBox 51"/>
@@ -8252,58 +8170,17 @@
       </p:sp>
       <p:cxnSp>
         <p:nvCxnSpPr>
-          <p:cNvPr id="160" name="Straight Arrow Connector 159"/>
+          <p:cNvPr id="163" name="Straight Arrow Connector 162"/>
           <p:cNvCxnSpPr>
-            <a:stCxn id="12" idx="2"/>
+            <a:stCxn id="23" idx="3"/>
             <a:endCxn id="159" idx="3"/>
           </p:cNvCxnSpPr>
           <p:nvPr/>
         </p:nvCxnSpPr>
         <p:spPr>
-          <a:xfrm>
-            <a:off x="3312170" y="4843182"/>
-            <a:ext cx="3733163" cy="496553"/>
-          </a:xfrm>
-          <a:prstGeom prst="straightConnector1">
-            <a:avLst/>
-          </a:prstGeom>
-          <a:ln>
-            <a:solidFill>
-              <a:schemeClr val="tx1"/>
-            </a:solidFill>
-            <a:prstDash val="solid"/>
-            <a:headEnd type="none" w="med" len="med"/>
-            <a:tailEnd type="arrow" w="med" len="med"/>
-          </a:ln>
-        </p:spPr>
-        <p:style>
-          <a:lnRef idx="1">
-            <a:schemeClr val="accent1"/>
-          </a:lnRef>
-          <a:fillRef idx="0">
-            <a:schemeClr val="accent1"/>
-          </a:fillRef>
-          <a:effectRef idx="0">
-            <a:schemeClr val="accent1"/>
-          </a:effectRef>
-          <a:fontRef idx="minor">
-            <a:schemeClr val="tx1"/>
-          </a:fontRef>
-        </p:style>
-      </p:cxnSp>
-      <p:cxnSp>
-        <p:nvCxnSpPr>
-          <p:cNvPr id="163" name="Straight Arrow Connector 162"/>
-          <p:cNvCxnSpPr>
-            <a:stCxn id="24" idx="2"/>
-            <a:endCxn id="159" idx="3"/>
-          </p:cNvCxnSpPr>
-          <p:nvPr/>
-        </p:nvCxnSpPr>
-        <p:spPr>
           <a:xfrm flipH="1">
-            <a:off x="7045333" y="4839949"/>
-            <a:ext cx="1701807" cy="499786"/>
+            <a:off x="7045333" y="3717728"/>
+            <a:ext cx="1171633" cy="1622007"/>
           </a:xfrm>
           <a:prstGeom prst="straightConnector1">
             <a:avLst/>
@@ -8869,7 +8746,7 @@
         <p:spPr>
           <a:xfrm flipH="1" flipV="1">
             <a:off x="1336358" y="2698924"/>
-            <a:ext cx="1" cy="501976"/>
+            <a:ext cx="1" cy="514692"/>
           </a:xfrm>
           <a:prstGeom prst="straightConnector1">
             <a:avLst/>
@@ -8909,8 +8786,8 @@
         </p:nvCxnSpPr>
         <p:spPr>
           <a:xfrm>
-            <a:off x="1336359" y="3773924"/>
-            <a:ext cx="0" cy="484024"/>
+            <a:off x="1336359" y="3786640"/>
+            <a:ext cx="0" cy="471308"/>
           </a:xfrm>
           <a:prstGeom prst="straightConnector1">
             <a:avLst/>
@@ -8939,6 +8816,316 @@
           </a:fontRef>
         </p:style>
       </p:cxnSp>
+      <p:cxnSp>
+        <p:nvCxnSpPr>
+          <p:cNvPr id="206" name="Curved Connector 205"/>
+          <p:cNvCxnSpPr>
+            <a:stCxn id="19" idx="2"/>
+            <a:endCxn id="31" idx="2"/>
+          </p:cNvCxnSpPr>
+          <p:nvPr/>
+        </p:nvCxnSpPr>
+        <p:spPr>
+          <a:xfrm rot="10800000" flipH="1" flipV="1">
+            <a:off x="586580" y="3500127"/>
+            <a:ext cx="2173958" cy="2126119"/>
+          </a:xfrm>
+          <a:prstGeom prst="curvedConnector3">
+            <a:avLst>
+              <a:gd name="adj1" fmla="val -10515"/>
+            </a:avLst>
+          </a:prstGeom>
+          <a:ln>
+            <a:solidFill>
+              <a:schemeClr val="tx1"/>
+            </a:solidFill>
+            <a:headEnd type="none" w="med" len="med"/>
+            <a:tailEnd type="arrow" w="med" len="med"/>
+          </a:ln>
+        </p:spPr>
+        <p:style>
+          <a:lnRef idx="1">
+            <a:schemeClr val="accent1"/>
+          </a:lnRef>
+          <a:fillRef idx="0">
+            <a:schemeClr val="accent1"/>
+          </a:fillRef>
+          <a:effectRef idx="0">
+            <a:schemeClr val="accent1"/>
+          </a:effectRef>
+          <a:fontRef idx="minor">
+            <a:schemeClr val="tx1"/>
+          </a:fontRef>
+        </p:style>
+      </p:cxnSp>
+      <p:cxnSp>
+        <p:nvCxnSpPr>
+          <p:cNvPr id="209" name="Curved Connector 208"/>
+          <p:cNvCxnSpPr>
+            <a:stCxn id="27" idx="6"/>
+            <a:endCxn id="31" idx="0"/>
+          </p:cNvCxnSpPr>
+          <p:nvPr/>
+        </p:nvCxnSpPr>
+        <p:spPr>
+          <a:xfrm flipH="1">
+            <a:off x="3943162" y="3499622"/>
+            <a:ext cx="2150143" cy="2126625"/>
+          </a:xfrm>
+          <a:prstGeom prst="curvedConnector3">
+            <a:avLst>
+              <a:gd name="adj1" fmla="val -10632"/>
+            </a:avLst>
+          </a:prstGeom>
+          <a:ln>
+            <a:solidFill>
+              <a:schemeClr val="tx1"/>
+            </a:solidFill>
+            <a:headEnd type="none" w="med" len="med"/>
+            <a:tailEnd type="arrow" w="med" len="med"/>
+          </a:ln>
+        </p:spPr>
+        <p:style>
+          <a:lnRef idx="1">
+            <a:schemeClr val="accent1"/>
+          </a:lnRef>
+          <a:fillRef idx="0">
+            <a:schemeClr val="accent1"/>
+          </a:fillRef>
+          <a:effectRef idx="0">
+            <a:schemeClr val="accent1"/>
+          </a:effectRef>
+          <a:fontRef idx="minor">
+            <a:schemeClr val="tx1"/>
+          </a:fontRef>
+        </p:style>
+      </p:cxnSp>
+      <p:cxnSp>
+        <p:nvCxnSpPr>
+          <p:cNvPr id="212" name="Curved Connector 211"/>
+          <p:cNvCxnSpPr>
+            <a:stCxn id="11" idx="5"/>
+            <a:endCxn id="159" idx="2"/>
+          </p:cNvCxnSpPr>
+          <p:nvPr/>
+        </p:nvCxnSpPr>
+        <p:spPr>
+          <a:xfrm rot="16200000" flipH="1">
+            <a:off x="4186167" y="3358393"/>
+            <a:ext cx="1924030" cy="2611677"/>
+          </a:xfrm>
+          <a:prstGeom prst="curvedConnector2">
+            <a:avLst/>
+          </a:prstGeom>
+          <a:ln>
+            <a:solidFill>
+              <a:schemeClr val="tx1"/>
+            </a:solidFill>
+            <a:headEnd type="none" w="med" len="med"/>
+            <a:tailEnd type="arrow" w="med" len="med"/>
+          </a:ln>
+        </p:spPr>
+        <p:style>
+          <a:lnRef idx="1">
+            <a:schemeClr val="accent1"/>
+          </a:lnRef>
+          <a:fillRef idx="0">
+            <a:schemeClr val="accent1"/>
+          </a:fillRef>
+          <a:effectRef idx="0">
+            <a:schemeClr val="accent1"/>
+          </a:effectRef>
+          <a:fontRef idx="minor">
+            <a:schemeClr val="tx1"/>
+          </a:fontRef>
+        </p:style>
+      </p:cxnSp>
+      <p:sp>
+        <p:nvSpPr>
+          <p:cNvPr id="215" name="TextBox 214"/>
+          <p:cNvSpPr txBox="1"/>
+          <p:nvPr/>
+        </p:nvSpPr>
+        <p:spPr>
+          <a:xfrm>
+            <a:off x="1263554" y="5939847"/>
+            <a:ext cx="620683" cy="246221"/>
+          </a:xfrm>
+          <a:prstGeom prst="rect">
+            <a:avLst/>
+          </a:prstGeom>
+          <a:noFill/>
+        </p:spPr>
+        <p:txBody>
+          <a:bodyPr wrap="none" rtlCol="0">
+            <a:spAutoFit/>
+          </a:bodyPr>
+          <a:lstStyle/>
+          <a:p>
+            <a:r>
+              <a:rPr lang="en-US" sz="1000"/>
+              <a:t>storedIn</a:t>
+            </a:r>
+          </a:p>
+        </p:txBody>
+      </p:sp>
+      <p:sp>
+        <p:nvSpPr>
+          <p:cNvPr id="216" name="TextBox 215"/>
+          <p:cNvSpPr txBox="1"/>
+          <p:nvPr/>
+        </p:nvSpPr>
+        <p:spPr>
+          <a:xfrm>
+            <a:off x="4065385" y="5939848"/>
+            <a:ext cx="620683" cy="246221"/>
+          </a:xfrm>
+          <a:prstGeom prst="rect">
+            <a:avLst/>
+          </a:prstGeom>
+          <a:noFill/>
+        </p:spPr>
+        <p:txBody>
+          <a:bodyPr wrap="none" rtlCol="0">
+            <a:spAutoFit/>
+          </a:bodyPr>
+          <a:lstStyle/>
+          <a:p>
+            <a:r>
+              <a:rPr lang="en-US" sz="1000"/>
+              <a:t>storedIn</a:t>
+            </a:r>
+          </a:p>
+        </p:txBody>
+      </p:sp>
+      <p:sp>
+        <p:nvSpPr>
+          <p:cNvPr id="217" name="TextBox 216"/>
+          <p:cNvSpPr txBox="1"/>
+          <p:nvPr/>
+        </p:nvSpPr>
+        <p:spPr>
+          <a:xfrm>
+            <a:off x="8163330" y="5801622"/>
+            <a:ext cx="620683" cy="246221"/>
+          </a:xfrm>
+          <a:prstGeom prst="rect">
+            <a:avLst/>
+          </a:prstGeom>
+          <a:noFill/>
+        </p:spPr>
+        <p:txBody>
+          <a:bodyPr wrap="none" rtlCol="0">
+            <a:spAutoFit/>
+          </a:bodyPr>
+          <a:lstStyle/>
+          <a:p>
+            <a:r>
+              <a:rPr lang="en-US" sz="1000"/>
+              <a:t>storedIn</a:t>
+            </a:r>
+          </a:p>
+        </p:txBody>
+      </p:sp>
+      <p:sp>
+        <p:nvSpPr>
+          <p:cNvPr id="218" name="TextBox 217"/>
+          <p:cNvSpPr txBox="1"/>
+          <p:nvPr/>
+        </p:nvSpPr>
+        <p:spPr>
+          <a:xfrm>
+            <a:off x="5070532" y="5797518"/>
+            <a:ext cx="620683" cy="246221"/>
+          </a:xfrm>
+          <a:prstGeom prst="rect">
+            <a:avLst/>
+          </a:prstGeom>
+          <a:noFill/>
+        </p:spPr>
+        <p:txBody>
+          <a:bodyPr wrap="none" rtlCol="0">
+            <a:spAutoFit/>
+          </a:bodyPr>
+          <a:lstStyle/>
+          <a:p>
+            <a:r>
+              <a:rPr lang="en-US" sz="1000"/>
+              <a:t>storedIn</a:t>
+            </a:r>
+          </a:p>
+        </p:txBody>
+      </p:sp>
+      <p:cxnSp>
+        <p:nvCxnSpPr>
+          <p:cNvPr id="219" name="Straight Arrow Connector 218"/>
+          <p:cNvCxnSpPr>
+            <a:stCxn id="11" idx="2"/>
+            <a:endCxn id="19" idx="6"/>
+          </p:cNvCxnSpPr>
+          <p:nvPr/>
+        </p:nvCxnSpPr>
+        <p:spPr>
+          <a:xfrm flipH="1">
+            <a:off x="2086138" y="3499622"/>
+            <a:ext cx="476253" cy="506"/>
+          </a:xfrm>
+          <a:prstGeom prst="straightConnector1">
+            <a:avLst/>
+          </a:prstGeom>
+          <a:ln>
+            <a:solidFill>
+              <a:schemeClr val="tx1"/>
+            </a:solidFill>
+            <a:prstDash val="solid"/>
+            <a:headEnd type="none" w="med" len="med"/>
+            <a:tailEnd type="arrow" w="med" len="med"/>
+          </a:ln>
+        </p:spPr>
+        <p:style>
+          <a:lnRef idx="1">
+            <a:schemeClr val="accent1"/>
+          </a:lnRef>
+          <a:fillRef idx="0">
+            <a:schemeClr val="accent1"/>
+          </a:fillRef>
+          <a:effectRef idx="0">
+            <a:schemeClr val="accent1"/>
+          </a:effectRef>
+          <a:fontRef idx="minor">
+            <a:schemeClr val="tx1"/>
+          </a:fontRef>
+        </p:style>
+      </p:cxnSp>
+      <p:sp>
+        <p:nvSpPr>
+          <p:cNvPr id="222" name="TextBox 221"/>
+          <p:cNvSpPr txBox="1"/>
+          <p:nvPr/>
+        </p:nvSpPr>
+        <p:spPr>
+          <a:xfrm>
+            <a:off x="2039697" y="3555424"/>
+            <a:ext cx="688009" cy="246221"/>
+          </a:xfrm>
+          <a:prstGeom prst="rect">
+            <a:avLst/>
+          </a:prstGeom>
+          <a:noFill/>
+        </p:spPr>
+        <p:txBody>
+          <a:bodyPr wrap="none" rtlCol="0">
+            <a:spAutoFit/>
+          </a:bodyPr>
+          <a:lstStyle/>
+          <a:p>
+            <a:r>
+              <a:rPr lang="en-US" sz="1000"/>
+              <a:t>relatedTo</a:t>
+            </a:r>
+          </a:p>
+        </p:txBody>
+      </p:sp>
     </p:spTree>
     <p:extLst>
       <p:ext uri="{BB962C8B-B14F-4D97-AF65-F5344CB8AC3E}">

</xml_diff>

<commit_message>
deliberately creating a bad record, for discovery
</commit_message>
<xml_diff>
--- a/examples/graphs.pptx
+++ b/examples/graphs.pptx
@@ -8055,7 +8055,7 @@
         </p:nvSpPr>
         <p:spPr>
           <a:xfrm>
-            <a:off x="6553470" y="5822314"/>
+            <a:off x="6699288" y="5865410"/>
             <a:ext cx="1051891" cy="246221"/>
           </a:xfrm>
           <a:prstGeom prst="rect">
@@ -8247,7 +8247,7 @@
                   <a:schemeClr val="tx1"/>
                 </a:solidFill>
               </a:rPr>
-              <a:t>Dept Planning HPRM</a:t>
+              <a:t>Dept Planning SharePoint</a:t>
             </a:r>
           </a:p>
         </p:txBody>
@@ -8305,7 +8305,7 @@
                   <a:schemeClr val="tx1"/>
                 </a:solidFill>
               </a:rPr>
-              <a:t>Gov. Orch. Agency SharePoint</a:t>
+              <a:t>Gov. Orch. Agency HPRM</a:t>
             </a:r>
           </a:p>
         </p:txBody>
@@ -9314,7 +9314,7 @@
                   <a:schemeClr val="tx1"/>
                 </a:solidFill>
               </a:rPr>
-              <a:t>Digital Artifact</a:t>
+              <a:t>Digital Artefact</a:t>
             </a:r>
           </a:p>
         </p:txBody>
@@ -9600,7 +9600,7 @@
           </a:prstGeom>
           <a:ln>
             <a:solidFill>
-              <a:schemeClr val="tx1"/>
+              <a:srgbClr val="FF0000"/>
             </a:solidFill>
             <a:prstDash val="solid"/>
             <a:headEnd type="none" w="med" len="med"/>
@@ -9665,6 +9665,264 @@
       </p:cxnSp>
       <p:sp>
         <p:nvSpPr>
+          <p:cNvPr id="216" name="TextBox 215"/>
+          <p:cNvSpPr txBox="1"/>
+          <p:nvPr/>
+        </p:nvSpPr>
+        <p:spPr>
+          <a:xfrm>
+            <a:off x="4069742" y="5924732"/>
+            <a:ext cx="700232" cy="246221"/>
+          </a:xfrm>
+          <a:prstGeom prst="rect">
+            <a:avLst/>
+          </a:prstGeom>
+          <a:solidFill>
+            <a:schemeClr val="bg1"/>
+          </a:solidFill>
+        </p:spPr>
+        <p:txBody>
+          <a:bodyPr wrap="square" rtlCol="0">
+            <a:spAutoFit/>
+          </a:bodyPr>
+          <a:lstStyle/>
+          <a:p>
+            <a:r>
+              <a:rPr lang="en-US" sz="1000"/>
+              <a:t>storedIn</a:t>
+            </a:r>
+          </a:p>
+        </p:txBody>
+      </p:sp>
+      <p:sp>
+        <p:nvSpPr>
+          <p:cNvPr id="128" name="TextBox 127"/>
+          <p:cNvSpPr txBox="1"/>
+          <p:nvPr/>
+        </p:nvSpPr>
+        <p:spPr>
+          <a:xfrm>
+            <a:off x="4714766" y="6194221"/>
+            <a:ext cx="933269" cy="246221"/>
+          </a:xfrm>
+          <a:prstGeom prst="rect">
+            <a:avLst/>
+          </a:prstGeom>
+          <a:noFill/>
+        </p:spPr>
+        <p:txBody>
+          <a:bodyPr wrap="none" rtlCol="0">
+            <a:spAutoFit/>
+          </a:bodyPr>
+          <a:lstStyle/>
+          <a:p>
+            <a:r>
+              <a:rPr lang="en-US" sz="1000">
+                <a:solidFill>
+                  <a:srgbClr val="FF0000"/>
+                </a:solidFill>
+              </a:rPr>
+              <a:t>as it should be</a:t>
+            </a:r>
+          </a:p>
+        </p:txBody>
+      </p:sp>
+      <p:cxnSp>
+        <p:nvCxnSpPr>
+          <p:cNvPr id="129" name="Curved Connector 128"/>
+          <p:cNvCxnSpPr>
+            <a:stCxn id="128" idx="0"/>
+          </p:cNvCxnSpPr>
+          <p:nvPr/>
+        </p:nvCxnSpPr>
+        <p:spPr>
+          <a:xfrm rot="16200000" flipV="1">
+            <a:off x="4847369" y="5860189"/>
+            <a:ext cx="574080" cy="93984"/>
+          </a:xfrm>
+          <a:prstGeom prst="curvedConnector3">
+            <a:avLst>
+              <a:gd name="adj1" fmla="val 50000"/>
+            </a:avLst>
+          </a:prstGeom>
+          <a:ln>
+            <a:solidFill>
+              <a:srgbClr val="FF0000"/>
+            </a:solidFill>
+            <a:prstDash val="sysDot"/>
+            <a:headEnd type="none" w="med" len="med"/>
+            <a:tailEnd type="arrow" w="med" len="med"/>
+          </a:ln>
+        </p:spPr>
+        <p:style>
+          <a:lnRef idx="1">
+            <a:schemeClr val="accent1"/>
+          </a:lnRef>
+          <a:fillRef idx="0">
+            <a:schemeClr val="accent1"/>
+          </a:fillRef>
+          <a:effectRef idx="0">
+            <a:schemeClr val="accent1"/>
+          </a:effectRef>
+          <a:fontRef idx="minor">
+            <a:schemeClr val="tx1"/>
+          </a:fontRef>
+        </p:style>
+      </p:cxnSp>
+      <p:sp>
+        <p:nvSpPr>
+          <p:cNvPr id="136" name="TextBox 135"/>
+          <p:cNvSpPr txBox="1"/>
+          <p:nvPr/>
+        </p:nvSpPr>
+        <p:spPr>
+          <a:xfrm>
+            <a:off x="5648035" y="6575745"/>
+            <a:ext cx="1088760" cy="246221"/>
+          </a:xfrm>
+          <a:prstGeom prst="rect">
+            <a:avLst/>
+          </a:prstGeom>
+          <a:noFill/>
+        </p:spPr>
+        <p:txBody>
+          <a:bodyPr wrap="none" rtlCol="0">
+            <a:spAutoFit/>
+          </a:bodyPr>
+          <a:lstStyle/>
+          <a:p>
+            <a:r>
+              <a:rPr lang="en-US" sz="1000">
+                <a:solidFill>
+                  <a:srgbClr val="0070C0"/>
+                </a:solidFill>
+              </a:rPr>
+              <a:t>as it incorrectly is</a:t>
+            </a:r>
+          </a:p>
+        </p:txBody>
+      </p:sp>
+      <p:cxnSp>
+        <p:nvCxnSpPr>
+          <p:cNvPr id="137" name="Curved Connector 136"/>
+          <p:cNvCxnSpPr>
+            <a:stCxn id="136" idx="0"/>
+          </p:cNvCxnSpPr>
+          <p:nvPr/>
+        </p:nvCxnSpPr>
+        <p:spPr>
+          <a:xfrm rot="16200000" flipV="1">
+            <a:off x="5986943" y="6370272"/>
+            <a:ext cx="358044" cy="52901"/>
+          </a:xfrm>
+          <a:prstGeom prst="curvedConnector3">
+            <a:avLst>
+              <a:gd name="adj1" fmla="val 50000"/>
+            </a:avLst>
+          </a:prstGeom>
+          <a:ln>
+            <a:solidFill>
+              <a:schemeClr val="accent1"/>
+            </a:solidFill>
+            <a:prstDash val="sysDot"/>
+            <a:headEnd type="none" w="med" len="med"/>
+            <a:tailEnd type="arrow" w="med" len="med"/>
+          </a:ln>
+        </p:spPr>
+        <p:style>
+          <a:lnRef idx="1">
+            <a:schemeClr val="accent1"/>
+          </a:lnRef>
+          <a:fillRef idx="0">
+            <a:schemeClr val="accent1"/>
+          </a:fillRef>
+          <a:effectRef idx="0">
+            <a:schemeClr val="accent1"/>
+          </a:effectRef>
+          <a:fontRef idx="minor">
+            <a:schemeClr val="tx1"/>
+          </a:fontRef>
+        </p:style>
+      </p:cxnSp>
+      <p:sp>
+        <p:nvSpPr>
+          <p:cNvPr id="141" name="TextBox 140"/>
+          <p:cNvSpPr txBox="1"/>
+          <p:nvPr/>
+        </p:nvSpPr>
+        <p:spPr>
+          <a:xfrm>
+            <a:off x="4178978" y="6540946"/>
+            <a:ext cx="620683" cy="246221"/>
+          </a:xfrm>
+          <a:prstGeom prst="rect">
+            <a:avLst/>
+          </a:prstGeom>
+          <a:solidFill>
+            <a:schemeClr val="bg1"/>
+          </a:solidFill>
+        </p:spPr>
+        <p:txBody>
+          <a:bodyPr wrap="none" rtlCol="0">
+            <a:spAutoFit/>
+          </a:bodyPr>
+          <a:lstStyle/>
+          <a:p>
+            <a:r>
+              <a:rPr lang="en-US" sz="1000">
+                <a:solidFill>
+                  <a:srgbClr val="0070C0"/>
+                </a:solidFill>
+              </a:rPr>
+              <a:t>storedIn</a:t>
+            </a:r>
+          </a:p>
+        </p:txBody>
+      </p:sp>
+      <p:cxnSp>
+        <p:nvCxnSpPr>
+          <p:cNvPr id="132" name="Curved Connector 131"/>
+          <p:cNvCxnSpPr>
+            <a:stCxn id="74" idx="2"/>
+            <a:endCxn id="169" idx="1"/>
+          </p:cNvCxnSpPr>
+          <p:nvPr/>
+        </p:nvCxnSpPr>
+        <p:spPr>
+          <a:xfrm rot="5400000">
+            <a:off x="3266039" y="2970867"/>
+            <a:ext cx="1661503" cy="5789087"/>
+          </a:xfrm>
+          <a:prstGeom prst="curvedConnector3">
+            <a:avLst>
+              <a:gd name="adj1" fmla="val 106228"/>
+            </a:avLst>
+          </a:prstGeom>
+          <a:ln>
+            <a:solidFill>
+              <a:schemeClr val="accent1"/>
+            </a:solidFill>
+            <a:headEnd type="none" w="med" len="med"/>
+            <a:tailEnd type="arrow" w="med" len="med"/>
+          </a:ln>
+        </p:spPr>
+        <p:style>
+          <a:lnRef idx="1">
+            <a:schemeClr val="accent1"/>
+          </a:lnRef>
+          <a:fillRef idx="0">
+            <a:schemeClr val="accent1"/>
+          </a:fillRef>
+          <a:effectRef idx="0">
+            <a:schemeClr val="accent1"/>
+          </a:effectRef>
+          <a:fontRef idx="minor">
+            <a:schemeClr val="tx1"/>
+          </a:fontRef>
+        </p:style>
+      </p:cxnSp>
+      <p:sp>
+        <p:nvSpPr>
           <p:cNvPr id="75" name="Folded Corner 74"/>
           <p:cNvSpPr/>
           <p:nvPr/>
@@ -9717,37 +9975,6 @@
                 </a:solidFill>
               </a:rPr>
               <a:t>Policy and Procedure Policy 2017 Final Appendix A DOCX</a:t>
-            </a:r>
-          </a:p>
-        </p:txBody>
-      </p:sp>
-      <p:sp>
-        <p:nvSpPr>
-          <p:cNvPr id="216" name="TextBox 215"/>
-          <p:cNvSpPr txBox="1"/>
-          <p:nvPr/>
-        </p:nvSpPr>
-        <p:spPr>
-          <a:xfrm>
-            <a:off x="4069742" y="5924732"/>
-            <a:ext cx="700232" cy="246221"/>
-          </a:xfrm>
-          <a:prstGeom prst="rect">
-            <a:avLst/>
-          </a:prstGeom>
-          <a:solidFill>
-            <a:schemeClr val="bg1"/>
-          </a:solidFill>
-        </p:spPr>
-        <p:txBody>
-          <a:bodyPr wrap="square" rtlCol="0">
-            <a:spAutoFit/>
-          </a:bodyPr>
-          <a:lstStyle/>
-          <a:p>
-            <a:r>
-              <a:rPr lang="en-US" sz="1000"/>
-              <a:t>storedIn</a:t>
             </a:r>
           </a:p>
         </p:txBody>

</xml_diff>